<commit_message>
orientacion de manual y demas
</commit_message>
<xml_diff>
--- a/Presentacion_Transcriptor.pptx
+++ b/Presentacion_Transcriptor.pptx
@@ -5590,8 +5590,24 @@
             </a:lnSpc>
           </a:pPr>
           <a:r>
-            <a:rPr lang="en-US"/>
-            <a:t>• Soporta formatos: MP3, WAV, FLAC, OGG, M4A, MP4, AAC</a:t>
+            <a:rPr lang="en-US" dirty="0"/>
+            <a:t>• </a:t>
+          </a:r>
+          <a:r>
+            <a:rPr lang="en-US" dirty="0" err="1"/>
+            <a:t>Soporta</a:t>
+          </a:r>
+          <a:r>
+            <a:rPr lang="en-US" dirty="0"/>
+            <a:t> </a:t>
+          </a:r>
+          <a:r>
+            <a:rPr lang="en-US" dirty="0" err="1"/>
+            <a:t>formatos</a:t>
+          </a:r>
+          <a:r>
+            <a:rPr lang="en-US" dirty="0"/>
+            <a:t>: MP3, WAV, FLAC, OGG, M4A, MP4, AAC, OPUS</a:t>
           </a:r>
         </a:p>
       </dgm:t>
@@ -8415,8 +8431,24 @@
             <a:buNone/>
           </a:pPr>
           <a:r>
-            <a:rPr lang="en-US" sz="1900" kern="1200"/>
-            <a:t>• Soporta formatos: MP3, WAV, FLAC, OGG, M4A, MP4, AAC</a:t>
+            <a:rPr lang="en-US" sz="1900" kern="1200" dirty="0"/>
+            <a:t>• </a:t>
+          </a:r>
+          <a:r>
+            <a:rPr lang="en-US" sz="1900" kern="1200" dirty="0" err="1"/>
+            <a:t>Soporta</a:t>
+          </a:r>
+          <a:r>
+            <a:rPr lang="en-US" sz="1900" kern="1200" dirty="0"/>
+            <a:t> </a:t>
+          </a:r>
+          <a:r>
+            <a:rPr lang="en-US" sz="1900" kern="1200" dirty="0" err="1"/>
+            <a:t>formatos</a:t>
+          </a:r>
+          <a:r>
+            <a:rPr lang="en-US" sz="1900" kern="1200" dirty="0"/>
+            <a:t>: MP3, WAV, FLAC, OGG, M4A, MP4, AAC, OPUS</a:t>
           </a:r>
         </a:p>
       </dsp:txBody>
@@ -19001,7 +19033,7 @@
           <a:p>
             <a:fld id="{5BCAD085-E8A6-8845-BD4E-CB4CCA059FC4}" type="datetimeFigureOut">
               <a:rPr lang="en-US" smtClean="0"/>
-              <a:t>7/17/2024</a:t>
+              <a:t>7/19/2024</a:t>
             </a:fld>
             <a:endParaRPr lang="en-US"/>
           </a:p>
@@ -19043,7 +19075,7 @@
           <a:p>
             <a:fld id="{C1FF6DA9-008F-8B48-92A6-B652298478BF}" type="slidenum">
               <a:rPr lang="en-US" smtClean="0"/>
-              <a:t>‹#›</a:t>
+              <a:t>‹Nº›</a:t>
             </a:fld>
             <a:endParaRPr lang="en-US"/>
           </a:p>
@@ -19169,7 +19201,7 @@
           <a:p>
             <a:fld id="{5BCAD085-E8A6-8845-BD4E-CB4CCA059FC4}" type="datetimeFigureOut">
               <a:rPr lang="en-US" smtClean="0"/>
-              <a:t>7/17/2024</a:t>
+              <a:t>7/19/2024</a:t>
             </a:fld>
             <a:endParaRPr lang="en-US"/>
           </a:p>
@@ -19211,7 +19243,7 @@
           <a:p>
             <a:fld id="{C1FF6DA9-008F-8B48-92A6-B652298478BF}" type="slidenum">
               <a:rPr lang="en-US" smtClean="0"/>
-              <a:t>‹#›</a:t>
+              <a:t>‹Nº›</a:t>
             </a:fld>
             <a:endParaRPr lang="en-US"/>
           </a:p>
@@ -19347,7 +19379,7 @@
           <a:p>
             <a:fld id="{5BCAD085-E8A6-8845-BD4E-CB4CCA059FC4}" type="datetimeFigureOut">
               <a:rPr lang="en-US" smtClean="0"/>
-              <a:t>7/17/2024</a:t>
+              <a:t>7/19/2024</a:t>
             </a:fld>
             <a:endParaRPr lang="en-US"/>
           </a:p>
@@ -19389,7 +19421,7 @@
           <a:p>
             <a:fld id="{C1FF6DA9-008F-8B48-92A6-B652298478BF}" type="slidenum">
               <a:rPr lang="en-US" smtClean="0"/>
-              <a:t>‹#›</a:t>
+              <a:t>‹Nº›</a:t>
             </a:fld>
             <a:endParaRPr lang="en-US"/>
           </a:p>
@@ -19515,7 +19547,7 @@
           <a:p>
             <a:fld id="{5BCAD085-E8A6-8845-BD4E-CB4CCA059FC4}" type="datetimeFigureOut">
               <a:rPr lang="en-US" smtClean="0"/>
-              <a:t>7/17/2024</a:t>
+              <a:t>7/19/2024</a:t>
             </a:fld>
             <a:endParaRPr lang="en-US"/>
           </a:p>
@@ -19557,7 +19589,7 @@
           <a:p>
             <a:fld id="{C1FF6DA9-008F-8B48-92A6-B652298478BF}" type="slidenum">
               <a:rPr lang="en-US" smtClean="0"/>
-              <a:t>‹#›</a:t>
+              <a:t>‹Nº›</a:t>
             </a:fld>
             <a:endParaRPr lang="en-US"/>
           </a:p>
@@ -19760,7 +19792,7 @@
           <a:p>
             <a:fld id="{5BCAD085-E8A6-8845-BD4E-CB4CCA059FC4}" type="datetimeFigureOut">
               <a:rPr lang="en-US" smtClean="0"/>
-              <a:t>7/17/2024</a:t>
+              <a:t>7/19/2024</a:t>
             </a:fld>
             <a:endParaRPr lang="en-US"/>
           </a:p>
@@ -19802,7 +19834,7 @@
           <a:p>
             <a:fld id="{C1FF6DA9-008F-8B48-92A6-B652298478BF}" type="slidenum">
               <a:rPr lang="en-US" smtClean="0"/>
-              <a:t>‹#›</a:t>
+              <a:t>‹Nº›</a:t>
             </a:fld>
             <a:endParaRPr lang="en-US"/>
           </a:p>
@@ -20045,7 +20077,7 @@
           <a:p>
             <a:fld id="{5BCAD085-E8A6-8845-BD4E-CB4CCA059FC4}" type="datetimeFigureOut">
               <a:rPr lang="en-US" smtClean="0"/>
-              <a:t>7/17/2024</a:t>
+              <a:t>7/19/2024</a:t>
             </a:fld>
             <a:endParaRPr lang="en-US"/>
           </a:p>
@@ -20087,7 +20119,7 @@
           <a:p>
             <a:fld id="{C1FF6DA9-008F-8B48-92A6-B652298478BF}" type="slidenum">
               <a:rPr lang="en-US" smtClean="0"/>
-              <a:t>‹#›</a:t>
+              <a:t>‹Nº›</a:t>
             </a:fld>
             <a:endParaRPr lang="en-US"/>
           </a:p>
@@ -20464,7 +20496,7 @@
           <a:p>
             <a:fld id="{5BCAD085-E8A6-8845-BD4E-CB4CCA059FC4}" type="datetimeFigureOut">
               <a:rPr lang="en-US" smtClean="0"/>
-              <a:t>7/17/2024</a:t>
+              <a:t>7/19/2024</a:t>
             </a:fld>
             <a:endParaRPr lang="en-US"/>
           </a:p>
@@ -20506,7 +20538,7 @@
           <a:p>
             <a:fld id="{C1FF6DA9-008F-8B48-92A6-B652298478BF}" type="slidenum">
               <a:rPr lang="en-US" smtClean="0"/>
-              <a:t>‹#›</a:t>
+              <a:t>‹Nº›</a:t>
             </a:fld>
             <a:endParaRPr lang="en-US"/>
           </a:p>
@@ -20581,7 +20613,7 @@
           <a:p>
             <a:fld id="{5BCAD085-E8A6-8845-BD4E-CB4CCA059FC4}" type="datetimeFigureOut">
               <a:rPr lang="en-US" smtClean="0"/>
-              <a:t>7/17/2024</a:t>
+              <a:t>7/19/2024</a:t>
             </a:fld>
             <a:endParaRPr lang="en-US"/>
           </a:p>
@@ -20623,7 +20655,7 @@
           <a:p>
             <a:fld id="{C1FF6DA9-008F-8B48-92A6-B652298478BF}" type="slidenum">
               <a:rPr lang="en-US" smtClean="0"/>
-              <a:t>‹#›</a:t>
+              <a:t>‹Nº›</a:t>
             </a:fld>
             <a:endParaRPr lang="en-US"/>
           </a:p>
@@ -20676,7 +20708,7 @@
           <a:p>
             <a:fld id="{5BCAD085-E8A6-8845-BD4E-CB4CCA059FC4}" type="datetimeFigureOut">
               <a:rPr lang="en-US" smtClean="0"/>
-              <a:t>7/17/2024</a:t>
+              <a:t>7/19/2024</a:t>
             </a:fld>
             <a:endParaRPr lang="en-US"/>
           </a:p>
@@ -20718,7 +20750,7 @@
           <a:p>
             <a:fld id="{C1FF6DA9-008F-8B48-92A6-B652298478BF}" type="slidenum">
               <a:rPr lang="en-US" smtClean="0"/>
-              <a:t>‹#›</a:t>
+              <a:t>‹Nº›</a:t>
             </a:fld>
             <a:endParaRPr lang="en-US"/>
           </a:p>
@@ -20951,7 +20983,7 @@
           <a:p>
             <a:fld id="{5BCAD085-E8A6-8845-BD4E-CB4CCA059FC4}" type="datetimeFigureOut">
               <a:rPr lang="en-US" smtClean="0"/>
-              <a:t>7/17/2024</a:t>
+              <a:t>7/19/2024</a:t>
             </a:fld>
             <a:endParaRPr lang="en-US"/>
           </a:p>
@@ -20993,7 +21025,7 @@
           <a:p>
             <a:fld id="{C1FF6DA9-008F-8B48-92A6-B652298478BF}" type="slidenum">
               <a:rPr lang="en-US" smtClean="0"/>
-              <a:t>‹#›</a:t>
+              <a:t>‹Nº›</a:t>
             </a:fld>
             <a:endParaRPr lang="en-US"/>
           </a:p>
@@ -21203,7 +21235,7 @@
           <a:p>
             <a:fld id="{5BCAD085-E8A6-8845-BD4E-CB4CCA059FC4}" type="datetimeFigureOut">
               <a:rPr lang="en-US" smtClean="0"/>
-              <a:t>7/17/2024</a:t>
+              <a:t>7/19/2024</a:t>
             </a:fld>
             <a:endParaRPr lang="en-US"/>
           </a:p>
@@ -21245,7 +21277,7 @@
           <a:p>
             <a:fld id="{C1FF6DA9-008F-8B48-92A6-B652298478BF}" type="slidenum">
               <a:rPr lang="en-US" smtClean="0"/>
-              <a:t>‹#›</a:t>
+              <a:t>‹Nº›</a:t>
             </a:fld>
             <a:endParaRPr lang="en-US"/>
           </a:p>
@@ -21414,7 +21446,7 @@
           <a:p>
             <a:fld id="{5BCAD085-E8A6-8845-BD4E-CB4CCA059FC4}" type="datetimeFigureOut">
               <a:rPr lang="en-US" smtClean="0"/>
-              <a:t>7/17/2024</a:t>
+              <a:t>7/19/2024</a:t>
             </a:fld>
             <a:endParaRPr lang="en-US"/>
           </a:p>
@@ -21492,7 +21524,7 @@
           <a:p>
             <a:fld id="{C1FF6DA9-008F-8B48-92A6-B652298478BF}" type="slidenum">
               <a:rPr lang="en-US" smtClean="0"/>
-              <a:t>‹#›</a:t>
+              <a:t>‹Nº›</a:t>
             </a:fld>
             <a:endParaRPr lang="en-US"/>
           </a:p>
@@ -24326,7 +24358,7 @@
             <p:ph idx="1"/>
             <p:extLst>
               <p:ext uri="{D42A27DB-BD31-4B8C-83A1-F6EECF244321}">
-                <p14:modId xmlns:p14="http://schemas.microsoft.com/office/powerpoint/2010/main" val="3567785157"/>
+                <p14:modId xmlns:p14="http://schemas.microsoft.com/office/powerpoint/2010/main" val="1968793906"/>
               </p:ext>
             </p:extLst>
           </p:nvPr>
@@ -25236,15 +25268,15 @@
           </p:cNvPicPr>
           <p:nvPr/>
         </p:nvPicPr>
-        <p:blipFill>
+        <p:blipFill rotWithShape="1">
           <a:blip r:embed="rId2"/>
-          <a:srcRect l="5312" r="14283"/>
+          <a:srcRect l="-2650" r="-13"/>
           <a:stretch/>
         </p:blipFill>
         <p:spPr>
           <a:xfrm>
-            <a:off x="342900" y="457200"/>
-            <a:ext cx="8458200" cy="5943600"/>
+            <a:off x="-216309" y="457200"/>
+            <a:ext cx="9341805" cy="5943600"/>
           </a:xfrm>
           <a:prstGeom prst="rect">
             <a:avLst/>

</xml_diff>